<commit_message>
Small modification in the document
</commit_message>
<xml_diff>
--- a/Docs-FR.pptx
+++ b/Docs-FR.pptx
@@ -3784,7 +3784,7 @@
           <a:p>
             <a:fld id="{68796EA6-6F25-4F19-87BA-7ADCC16DAEFF}" type="datetimeFigureOut">
               <a:rPr lang="en-US" smtClean="0"/>
-              <a:t>5/1/2016</a:t>
+              <a:t>5/27/2018</a:t>
             </a:fld>
             <a:endParaRPr lang="en-US" dirty="0"/>
           </a:p>
@@ -3850,7 +3850,7 @@
           <a:p>
             <a:fld id="{C64E50CC-F33A-4EF4-9F12-93EC4A21A0CF}" type="slidenum">
               <a:rPr lang="en-US" smtClean="0"/>
-              <a:t>‹N°›</a:t>
+              <a:t>‹#›</a:t>
             </a:fld>
             <a:endParaRPr lang="en-US" dirty="0"/>
           </a:p>
@@ -3949,7 +3949,7 @@
           <a:p>
             <a:fld id="{C39C172E-A8B5-46F6-B05C-DFA3E2E0F207}" type="datetimeFigureOut">
               <a:rPr lang="en-US" smtClean="0"/>
-              <a:t>5/1/2016</a:t>
+              <a:t>5/27/2018</a:t>
             </a:fld>
             <a:endParaRPr lang="en-US" dirty="0"/>
           </a:p>
@@ -4108,7 +4108,7 @@
           <a:p>
             <a:fld id="{32674CE4-FBD8-4481-AEFB-CA53E599A745}" type="slidenum">
               <a:rPr lang="en-US" smtClean="0"/>
-              <a:t>‹N°›</a:t>
+              <a:t>‹#›</a:t>
             </a:fld>
             <a:endParaRPr lang="en-US" dirty="0"/>
           </a:p>
@@ -4674,7 +4674,7 @@
           <a:p>
             <a:fld id="{855C7A2C-29E4-488A-8354-73BBFE45D3D7}" type="datetime1">
               <a:rPr lang="en-US" smtClean="0"/>
-              <a:t>5/1/2016</a:t>
+              <a:t>5/27/2018</a:t>
             </a:fld>
             <a:endParaRPr lang="en-US" dirty="0"/>
           </a:p>
@@ -4803,7 +4803,7 @@
           <a:p>
             <a:fld id="{401CF334-2D5C-4859-84A6-CA7E6E43FAEB}" type="slidenum">
               <a:rPr lang="en-US" smtClean="0"/>
-              <a:t>‹N°›</a:t>
+              <a:t>‹#›</a:t>
             </a:fld>
             <a:endParaRPr lang="en-US" dirty="0"/>
           </a:p>
@@ -5031,7 +5031,7 @@
           <a:p>
             <a:fld id="{6C9A839B-D6A6-4599-B0EE-94E5D7B423B4}" type="datetime1">
               <a:rPr lang="en-US" smtClean="0"/>
-              <a:t>5/1/2016</a:t>
+              <a:t>5/27/2018</a:t>
             </a:fld>
             <a:endParaRPr lang="en-US" dirty="0"/>
           </a:p>
@@ -5160,7 +5160,7 @@
           <a:p>
             <a:fld id="{401CF334-2D5C-4859-84A6-CA7E6E43FAEB}" type="slidenum">
               <a:rPr lang="en-US" smtClean="0"/>
-              <a:t>‹N°›</a:t>
+              <a:t>‹#›</a:t>
             </a:fld>
             <a:endParaRPr lang="en-US" dirty="0"/>
           </a:p>
@@ -5444,7 +5444,7 @@
           <a:p>
             <a:fld id="{ED810503-F954-43CB-A0A0-0BDB1142EB5B}" type="datetime1">
               <a:rPr lang="en-US" smtClean="0"/>
-              <a:t>5/1/2016</a:t>
+              <a:t>5/27/2018</a:t>
             </a:fld>
             <a:endParaRPr lang="en-US" dirty="0"/>
           </a:p>
@@ -5573,7 +5573,7 @@
           <a:p>
             <a:fld id="{401CF334-2D5C-4859-84A6-CA7E6E43FAEB}" type="slidenum">
               <a:rPr lang="en-US" smtClean="0"/>
-              <a:t>‹N°›</a:t>
+              <a:t>‹#›</a:t>
             </a:fld>
             <a:endParaRPr lang="en-US" dirty="0"/>
           </a:p>
@@ -5792,7 +5792,7 @@
           <a:p>
             <a:fld id="{AC72C866-69D5-453B-AE85-27101B7A64C1}" type="datetime1">
               <a:rPr lang="en-US" smtClean="0"/>
-              <a:t>5/1/2016</a:t>
+              <a:t>5/27/2018</a:t>
             </a:fld>
             <a:endParaRPr lang="en-US" dirty="0"/>
           </a:p>
@@ -5921,7 +5921,7 @@
           <a:p>
             <a:fld id="{401CF334-2D5C-4859-84A6-CA7E6E43FAEB}" type="slidenum">
               <a:rPr lang="en-US" smtClean="0"/>
-              <a:t>‹N°›</a:t>
+              <a:t>‹#›</a:t>
             </a:fld>
             <a:endParaRPr lang="en-US" dirty="0"/>
           </a:p>
@@ -6124,7 +6124,7 @@
           <a:p>
             <a:fld id="{2A1FFDB9-8CE9-4CF8-8CDA-2C5ED3D71BBA}" type="datetime1">
               <a:rPr lang="en-US" smtClean="0"/>
-              <a:t>5/1/2016</a:t>
+              <a:t>5/27/2018</a:t>
             </a:fld>
             <a:endParaRPr lang="en-US" dirty="0"/>
           </a:p>
@@ -6253,7 +6253,7 @@
           <a:p>
             <a:fld id="{401CF334-2D5C-4859-84A6-CA7E6E43FAEB}" type="slidenum">
               <a:rPr lang="en-US" smtClean="0"/>
-              <a:t>‹N°›</a:t>
+              <a:t>‹#›</a:t>
             </a:fld>
             <a:endParaRPr lang="en-US" dirty="0"/>
           </a:p>
@@ -6532,7 +6532,7 @@
           <a:p>
             <a:fld id="{FC022A11-A2C9-4E80-A222-82653F3B8825}" type="datetime1">
               <a:rPr lang="en-US" smtClean="0"/>
-              <a:t>5/1/2016</a:t>
+              <a:t>5/27/2018</a:t>
             </a:fld>
             <a:endParaRPr lang="en-US" dirty="0"/>
           </a:p>
@@ -6661,7 +6661,7 @@
           <a:p>
             <a:fld id="{401CF334-2D5C-4859-84A6-CA7E6E43FAEB}" type="slidenum">
               <a:rPr lang="en-US" smtClean="0"/>
-              <a:t>‹N°›</a:t>
+              <a:t>‹#›</a:t>
             </a:fld>
             <a:endParaRPr lang="en-US" dirty="0"/>
           </a:p>
@@ -6801,7 +6801,7 @@
           <a:p>
             <a:fld id="{82F39869-29CA-42D2-8188-6CBA5A2FD9EB}" type="datetime1">
               <a:rPr lang="en-US" smtClean="0"/>
-              <a:t>5/1/2016</a:t>
+              <a:t>5/27/2018</a:t>
             </a:fld>
             <a:endParaRPr lang="en-US" dirty="0"/>
           </a:p>
@@ -6925,7 +6925,7 @@
           <a:p>
             <a:fld id="{401CF334-2D5C-4859-84A6-CA7E6E43FAEB}" type="slidenum">
               <a:rPr lang="en-US" smtClean="0"/>
-              <a:t>‹N°›</a:t>
+              <a:t>‹#›</a:t>
             </a:fld>
             <a:endParaRPr lang="en-US" dirty="0"/>
           </a:p>
@@ -7082,7 +7082,7 @@
           <a:p>
             <a:fld id="{38132C06-C959-4835-A769-1C2337845076}" type="datetime1">
               <a:rPr lang="en-US" smtClean="0"/>
-              <a:t>5/1/2016</a:t>
+              <a:t>5/27/2018</a:t>
             </a:fld>
             <a:endParaRPr lang="en-US" dirty="0"/>
           </a:p>
@@ -7206,7 +7206,7 @@
           <a:p>
             <a:fld id="{401CF334-2D5C-4859-84A6-CA7E6E43FAEB}" type="slidenum">
               <a:rPr lang="en-US" smtClean="0"/>
-              <a:t>‹N°›</a:t>
+              <a:t>‹#›</a:t>
             </a:fld>
             <a:endParaRPr lang="en-US" dirty="0"/>
           </a:p>
@@ -7363,7 +7363,7 @@
           <a:p>
             <a:fld id="{651BEDAA-D97D-429C-9AD9-C3E4DE1D1BBB}" type="datetime1">
               <a:rPr lang="en-US" smtClean="0"/>
-              <a:t>5/1/2016</a:t>
+              <a:t>5/27/2018</a:t>
             </a:fld>
             <a:endParaRPr lang="en-US" dirty="0"/>
           </a:p>
@@ -7487,7 +7487,7 @@
           <a:p>
             <a:fld id="{401CF334-2D5C-4859-84A6-CA7E6E43FAEB}" type="slidenum">
               <a:rPr lang="en-US" smtClean="0"/>
-              <a:t>‹N°›</a:t>
+              <a:t>‹#›</a:t>
             </a:fld>
             <a:endParaRPr lang="en-US" dirty="0"/>
           </a:p>
@@ -7711,7 +7711,7 @@
           <a:p>
             <a:fld id="{E26A3485-287F-4E90-9808-ACCB912B72CE}" type="datetime1">
               <a:rPr lang="en-US" smtClean="0"/>
-              <a:t>5/1/2016</a:t>
+              <a:t>5/27/2018</a:t>
             </a:fld>
             <a:endParaRPr lang="en-US" dirty="0"/>
           </a:p>
@@ -7840,7 +7840,7 @@
           <a:p>
             <a:fld id="{401CF334-2D5C-4859-84A6-CA7E6E43FAEB}" type="slidenum">
               <a:rPr lang="en-US" smtClean="0"/>
-              <a:t>‹N°›</a:t>
+              <a:t>‹#›</a:t>
             </a:fld>
             <a:endParaRPr lang="en-US" dirty="0"/>
           </a:p>
@@ -8053,7 +8053,7 @@
           <a:p>
             <a:fld id="{F2A41F37-8F98-4D52-AEAB-E6902DCCDF0B}" type="datetime1">
               <a:rPr lang="en-US" smtClean="0"/>
-              <a:t>5/1/2016</a:t>
+              <a:t>5/27/2018</a:t>
             </a:fld>
             <a:endParaRPr lang="en-US" dirty="0"/>
           </a:p>
@@ -8182,7 +8182,7 @@
           <a:p>
             <a:fld id="{401CF334-2D5C-4859-84A6-CA7E6E43FAEB}" type="slidenum">
               <a:rPr lang="en-US" smtClean="0"/>
-              <a:t>‹N°›</a:t>
+              <a:t>‹#›</a:t>
             </a:fld>
             <a:endParaRPr lang="en-US" dirty="0"/>
           </a:p>
@@ -8545,7 +8545,7 @@
           <a:p>
             <a:fld id="{FE8E0B69-4707-42DE-8BE1-FBFD23A11436}" type="datetime1">
               <a:rPr lang="en-US" smtClean="0"/>
-              <a:t>5/1/2016</a:t>
+              <a:t>5/27/2018</a:t>
             </a:fld>
             <a:endParaRPr lang="en-US" dirty="0"/>
           </a:p>
@@ -8674,7 +8674,7 @@
           <a:p>
             <a:fld id="{401CF334-2D5C-4859-84A6-CA7E6E43FAEB}" type="slidenum">
               <a:rPr lang="en-US" smtClean="0"/>
-              <a:t>‹N°›</a:t>
+              <a:t>‹#›</a:t>
             </a:fld>
             <a:endParaRPr lang="en-US" dirty="0"/>
           </a:p>
@@ -8769,7 +8769,7 @@
           <a:p>
             <a:fld id="{F9178301-6BD8-4685-8DD8-9D9C3E4922D4}" type="datetime1">
               <a:rPr lang="en-US" smtClean="0"/>
-              <a:t>5/1/2016</a:t>
+              <a:t>5/27/2018</a:t>
             </a:fld>
             <a:endParaRPr lang="en-US" dirty="0"/>
           </a:p>
@@ -8893,7 +8893,7 @@
           <a:p>
             <a:fld id="{401CF334-2D5C-4859-84A6-CA7E6E43FAEB}" type="slidenum">
               <a:rPr lang="en-US" smtClean="0"/>
-              <a:t>‹N°›</a:t>
+              <a:t>‹#›</a:t>
             </a:fld>
             <a:endParaRPr lang="en-US" dirty="0"/>
           </a:p>
@@ -8965,7 +8965,7 @@
           <a:p>
             <a:fld id="{181F548A-0419-4680-9E49-48476D26D3E2}" type="datetime1">
               <a:rPr lang="en-US" smtClean="0"/>
-              <a:t>5/1/2016</a:t>
+              <a:t>5/27/2018</a:t>
             </a:fld>
             <a:endParaRPr lang="en-US" dirty="0"/>
           </a:p>
@@ -9089,7 +9089,7 @@
           <a:p>
             <a:fld id="{401CF334-2D5C-4859-84A6-CA7E6E43FAEB}" type="slidenum">
               <a:rPr lang="en-US" smtClean="0"/>
-              <a:t>‹N°›</a:t>
+              <a:t>‹#›</a:t>
             </a:fld>
             <a:endParaRPr lang="en-US" dirty="0"/>
           </a:p>
@@ -9317,7 +9317,7 @@
           <a:p>
             <a:fld id="{074987D9-21C5-4434-B8C2-5047407F807B}" type="datetime1">
               <a:rPr lang="en-US" smtClean="0"/>
-              <a:t>5/1/2016</a:t>
+              <a:t>5/27/2018</a:t>
             </a:fld>
             <a:endParaRPr lang="en-US" dirty="0"/>
           </a:p>
@@ -9441,7 +9441,7 @@
           <a:p>
             <a:fld id="{401CF334-2D5C-4859-84A6-CA7E6E43FAEB}" type="slidenum">
               <a:rPr lang="en-US" smtClean="0"/>
-              <a:t>‹N°›</a:t>
+              <a:t>‹#›</a:t>
             </a:fld>
             <a:endParaRPr lang="en-US" dirty="0"/>
           </a:p>
@@ -9681,7 +9681,7 @@
           <a:p>
             <a:fld id="{31B69501-B01B-437C-8585-6A97DEFB59FF}" type="datetime1">
               <a:rPr lang="en-US" smtClean="0"/>
-              <a:t>5/1/2016</a:t>
+              <a:t>5/27/2018</a:t>
             </a:fld>
             <a:endParaRPr lang="en-US" dirty="0"/>
           </a:p>
@@ -9810,7 +9810,7 @@
           <a:p>
             <a:fld id="{401CF334-2D5C-4859-84A6-CA7E6E43FAEB}" type="slidenum">
               <a:rPr lang="en-US" smtClean="0"/>
-              <a:t>‹N°›</a:t>
+              <a:t>‹#›</a:t>
             </a:fld>
             <a:endParaRPr lang="en-US" dirty="0"/>
           </a:p>
@@ -11817,7 +11817,7 @@
           <a:p>
             <a:fld id="{F83DA1D6-3FAB-4033-AE17-0F2A9DFBAA7F}" type="datetime1">
               <a:rPr lang="en-US" smtClean="0"/>
-              <a:t>5/1/2016</a:t>
+              <a:t>5/27/2018</a:t>
             </a:fld>
             <a:endParaRPr lang="en-US" dirty="0"/>
           </a:p>
@@ -11893,7 +11893,7 @@
           <a:p>
             <a:fld id="{401CF334-2D5C-4859-84A6-CA7E6E43FAEB}" type="slidenum">
               <a:rPr lang="en-US" smtClean="0"/>
-              <a:t>‹N°›</a:t>
+              <a:t>‹#›</a:t>
             </a:fld>
             <a:endParaRPr lang="en-US" dirty="0"/>
           </a:p>
@@ -12428,7 +12428,7 @@
         <p:spPr/>
         <p:txBody>
           <a:bodyPr>
-            <a:normAutofit lnSpcReduction="10000"/>
+            <a:normAutofit/>
           </a:bodyPr>
           <a:lstStyle/>
           <a:p>
@@ -12440,15 +12440,13 @@
           <a:p>
             <a:r>
               <a:rPr lang="fr-FR" dirty="0" smtClean="0"/>
-              <a:t>Abdellaoui Fahed</a:t>
+              <a:t>Abdellaoui </a:t>
             </a:r>
-          </a:p>
-          <a:p>
             <a:r>
-              <a:rPr lang="fr-FR" dirty="0" smtClean="0"/>
-              <a:t>Jabeur Soufien</a:t>
+              <a:rPr lang="fr-FR" dirty="0" err="1" smtClean="0"/>
+              <a:t>Fahed</a:t>
             </a:r>
-            <a:endParaRPr lang="en-US" dirty="0"/>
+            <a:endParaRPr lang="fr-FR" dirty="0" smtClean="0"/>
           </a:p>
         </p:txBody>
       </p:sp>
@@ -16719,7 +16717,6 @@
               <a:rPr lang="en-US" dirty="0" smtClean="0"/>
               <a:t>Architecture des Web services :</a:t>
             </a:r>
-            <a:endParaRPr lang="en-US" dirty="0" smtClean="0"/>
           </a:p>
         </p:txBody>
       </p:sp>

</xml_diff>